<commit_message>
ppt 수정 및 pack flutter 고침
</commit_message>
<xml_diff>
--- a/관리 앱 기획.pptx
+++ b/관리 앱 기획.pptx
@@ -110,6 +110,11 @@
       </a:defRPr>
     </a:lvl9pPr>
   </p:defaultTextStyle>
+  <p:extLst>
+    <p:ext uri="{EFAFB233-063F-42B5-8137-9DF3F51BA10A}">
+      <p15:sldGuideLst xmlns:p15="http://schemas.microsoft.com/office/powerpoint/2012/main"/>
+    </p:ext>
+  </p:extLst>
 </p:presentation>
 </file>
 
@@ -260,7 +265,7 @@
           <a:p>
             <a:fld id="{61FAB84A-B4A6-4849-AA98-B325EAAB6D53}" type="datetimeFigureOut">
               <a:rPr lang="ko-KR" altLang="en-US" smtClean="0"/>
-              <a:t>2025-11-16</a:t>
+              <a:t>2025-11-22</a:t>
             </a:fld>
             <a:endParaRPr lang="ko-KR" altLang="en-US"/>
           </a:p>
@@ -458,7 +463,7 @@
           <a:p>
             <a:fld id="{61FAB84A-B4A6-4849-AA98-B325EAAB6D53}" type="datetimeFigureOut">
               <a:rPr lang="ko-KR" altLang="en-US" smtClean="0"/>
-              <a:t>2025-11-16</a:t>
+              <a:t>2025-11-22</a:t>
             </a:fld>
             <a:endParaRPr lang="ko-KR" altLang="en-US"/>
           </a:p>
@@ -666,7 +671,7 @@
           <a:p>
             <a:fld id="{61FAB84A-B4A6-4849-AA98-B325EAAB6D53}" type="datetimeFigureOut">
               <a:rPr lang="ko-KR" altLang="en-US" smtClean="0"/>
-              <a:t>2025-11-16</a:t>
+              <a:t>2025-11-22</a:t>
             </a:fld>
             <a:endParaRPr lang="ko-KR" altLang="en-US"/>
           </a:p>
@@ -864,7 +869,7 @@
           <a:p>
             <a:fld id="{61FAB84A-B4A6-4849-AA98-B325EAAB6D53}" type="datetimeFigureOut">
               <a:rPr lang="ko-KR" altLang="en-US" smtClean="0"/>
-              <a:t>2025-11-16</a:t>
+              <a:t>2025-11-22</a:t>
             </a:fld>
             <a:endParaRPr lang="ko-KR" altLang="en-US"/>
           </a:p>
@@ -1139,7 +1144,7 @@
           <a:p>
             <a:fld id="{61FAB84A-B4A6-4849-AA98-B325EAAB6D53}" type="datetimeFigureOut">
               <a:rPr lang="ko-KR" altLang="en-US" smtClean="0"/>
-              <a:t>2025-11-16</a:t>
+              <a:t>2025-11-22</a:t>
             </a:fld>
             <a:endParaRPr lang="ko-KR" altLang="en-US"/>
           </a:p>
@@ -1404,7 +1409,7 @@
           <a:p>
             <a:fld id="{61FAB84A-B4A6-4849-AA98-B325EAAB6D53}" type="datetimeFigureOut">
               <a:rPr lang="ko-KR" altLang="en-US" smtClean="0"/>
-              <a:t>2025-11-16</a:t>
+              <a:t>2025-11-22</a:t>
             </a:fld>
             <a:endParaRPr lang="ko-KR" altLang="en-US"/>
           </a:p>
@@ -1816,7 +1821,7 @@
           <a:p>
             <a:fld id="{61FAB84A-B4A6-4849-AA98-B325EAAB6D53}" type="datetimeFigureOut">
               <a:rPr lang="ko-KR" altLang="en-US" smtClean="0"/>
-              <a:t>2025-11-16</a:t>
+              <a:t>2025-11-22</a:t>
             </a:fld>
             <a:endParaRPr lang="ko-KR" altLang="en-US"/>
           </a:p>
@@ -1957,7 +1962,7 @@
           <a:p>
             <a:fld id="{61FAB84A-B4A6-4849-AA98-B325EAAB6D53}" type="datetimeFigureOut">
               <a:rPr lang="ko-KR" altLang="en-US" smtClean="0"/>
-              <a:t>2025-11-16</a:t>
+              <a:t>2025-11-22</a:t>
             </a:fld>
             <a:endParaRPr lang="ko-KR" altLang="en-US"/>
           </a:p>
@@ -2070,7 +2075,7 @@
           <a:p>
             <a:fld id="{61FAB84A-B4A6-4849-AA98-B325EAAB6D53}" type="datetimeFigureOut">
               <a:rPr lang="ko-KR" altLang="en-US" smtClean="0"/>
-              <a:t>2025-11-16</a:t>
+              <a:t>2025-11-22</a:t>
             </a:fld>
             <a:endParaRPr lang="ko-KR" altLang="en-US"/>
           </a:p>
@@ -2381,7 +2386,7 @@
           <a:p>
             <a:fld id="{61FAB84A-B4A6-4849-AA98-B325EAAB6D53}" type="datetimeFigureOut">
               <a:rPr lang="ko-KR" altLang="en-US" smtClean="0"/>
-              <a:t>2025-11-16</a:t>
+              <a:t>2025-11-22</a:t>
             </a:fld>
             <a:endParaRPr lang="ko-KR" altLang="en-US"/>
           </a:p>
@@ -2669,7 +2674,7 @@
           <a:p>
             <a:fld id="{61FAB84A-B4A6-4849-AA98-B325EAAB6D53}" type="datetimeFigureOut">
               <a:rPr lang="ko-KR" altLang="en-US" smtClean="0"/>
-              <a:t>2025-11-16</a:t>
+              <a:t>2025-11-22</a:t>
             </a:fld>
             <a:endParaRPr lang="ko-KR" altLang="en-US"/>
           </a:p>
@@ -2910,7 +2915,7 @@
           <a:p>
             <a:fld id="{61FAB84A-B4A6-4849-AA98-B325EAAB6D53}" type="datetimeFigureOut">
               <a:rPr lang="ko-KR" altLang="en-US" smtClean="0"/>
-              <a:t>2025-11-16</a:t>
+              <a:t>2025-11-22</a:t>
             </a:fld>
             <a:endParaRPr lang="ko-KR" altLang="en-US"/>
           </a:p>
@@ -4095,8 +4100,8 @@
         </p:nvSpPr>
         <p:spPr>
           <a:xfrm>
-            <a:off x="206734" y="640485"/>
-            <a:ext cx="5889266" cy="5355312"/>
+            <a:off x="206733" y="640485"/>
+            <a:ext cx="10862319" cy="4524315"/>
           </a:xfrm>
           <a:prstGeom prst="rect">
             <a:avLst/>
@@ -4122,37 +4127,15 @@
             </a:pPr>
             <a:r>
               <a:rPr lang="ko-KR" altLang="en-US" dirty="0"/>
-              <a:t>학생 수업 관리</a:t>
-            </a:r>
-            <a:r>
-              <a:rPr lang="en-US" altLang="ko-KR" dirty="0"/>
-              <a:t>, </a:t>
-            </a:r>
-            <a:br>
-              <a:rPr lang="en-US" altLang="ko-KR" dirty="0"/>
-            </a:br>
-            <a:r>
-              <a:rPr lang="ko-KR" altLang="en-US" dirty="0"/>
-              <a:t>수업 </a:t>
-            </a:r>
-            <a:r>
-              <a:rPr lang="ko-KR" altLang="en-US" dirty="0" err="1"/>
-              <a:t>완료시</a:t>
-            </a:r>
-            <a:r>
-              <a:rPr lang="en-US" altLang="ko-KR" dirty="0"/>
-              <a:t> </a:t>
-            </a:r>
-            <a:r>
-              <a:rPr lang="ko-KR" altLang="en-US" dirty="0"/>
-              <a:t>평가</a:t>
-            </a:r>
-            <a:br>
-              <a:rPr lang="en-US" altLang="ko-KR" dirty="0"/>
-            </a:br>
-            <a:r>
-              <a:rPr lang="ko-KR" altLang="en-US" dirty="0"/>
-              <a:t>평가</a:t>
+              <a:t>학생 수업 관리 </a:t>
+            </a:r>
+            <a:r>
+              <a:rPr lang="en-US" altLang="ko-KR" dirty="0"/>
+              <a:t>— </a:t>
+            </a:r>
+            <a:r>
+              <a:rPr lang="ko-KR" altLang="en-US" dirty="0"/>
+              <a:t>수업 완료 시 평가</a:t>
             </a:r>
             <a:r>
               <a:rPr lang="en-US" altLang="ko-KR" dirty="0"/>
@@ -4160,7 +4143,7 @@
             </a:r>
             <a:r>
               <a:rPr lang="ko-KR" altLang="en-US" dirty="0"/>
-              <a:t>점 스크롤 가능</a:t>
+              <a:t>점 스크롤</a:t>
             </a:r>
             <a:r>
               <a:rPr lang="en-US" altLang="ko-KR" dirty="0"/>
@@ -4180,12 +4163,21 @@
               <a:rPr lang="ko-KR" altLang="en-US" dirty="0"/>
               <a:t>학생 수업 관리</a:t>
             </a:r>
-            <a:br>
-              <a:rPr lang="en-US" altLang="ko-KR" dirty="0"/>
-            </a:br>
-            <a:r>
-              <a:rPr lang="ko-KR" altLang="en-US" dirty="0"/>
-              <a:t>학생 탭에서 해당 학생을 선택한 뒤</a:t>
+            <a:r>
+              <a:rPr lang="en-US" altLang="ko-KR" dirty="0"/>
+              <a:t>(</a:t>
+            </a:r>
+            <a:r>
+              <a:rPr lang="ko-KR" altLang="en-US" dirty="0"/>
+              <a:t>편집</a:t>
+            </a:r>
+            <a:r>
+              <a:rPr lang="en-US" altLang="ko-KR" dirty="0"/>
+              <a:t>) — </a:t>
+            </a:r>
+            <a:r>
+              <a:rPr lang="ko-KR" altLang="en-US" dirty="0"/>
+              <a:t>학생 탭에서 해당 학생 선택 후</a:t>
             </a:r>
             <a:r>
               <a:rPr lang="en-US" altLang="ko-KR" dirty="0"/>
@@ -4217,22 +4209,15 @@
             </a:r>
             <a:r>
               <a:rPr lang="ko-KR" altLang="en-US" dirty="0"/>
-              <a:t>주 반복 설정 가능</a:t>
-            </a:r>
-            <a:br>
-              <a:rPr lang="en-US" altLang="ko-KR" dirty="0"/>
-            </a:br>
-            <a:r>
-              <a:rPr lang="en-US" altLang="ko-KR" dirty="0"/>
-              <a:t>(N </a:t>
-            </a:r>
-            <a:r>
-              <a:rPr lang="ko-KR" altLang="en-US" dirty="0" err="1"/>
-              <a:t>주간씩</a:t>
-            </a:r>
-            <a:r>
-              <a:rPr lang="ko-KR" altLang="en-US" dirty="0"/>
-              <a:t> 추가 가능</a:t>
+              <a:t>주 반복 설정 가능 </a:t>
+            </a:r>
+            <a:r>
+              <a:rPr lang="en-US" altLang="ko-KR" dirty="0"/>
+              <a:t>(N</a:t>
+            </a:r>
+            <a:r>
+              <a:rPr lang="ko-KR" altLang="en-US" dirty="0"/>
+              <a:t>주 간격 추가 가능</a:t>
             </a:r>
             <a:r>
               <a:rPr lang="en-US" altLang="ko-KR" dirty="0"/>
@@ -4250,22 +4235,162 @@
             </a:pPr>
             <a:r>
               <a:rPr lang="ko-KR" altLang="en-US" dirty="0"/>
-              <a:t>학생 숙제 설정</a:t>
+              <a:t>학생 숙제 설정 </a:t>
+            </a:r>
+            <a:r>
+              <a:rPr lang="en-US" altLang="ko-KR" dirty="0"/>
+              <a:t>(</a:t>
+            </a:r>
+            <a:r>
+              <a:rPr lang="ko-KR" altLang="en-US" dirty="0"/>
+              <a:t>중복 가능</a:t>
+            </a:r>
+            <a:r>
+              <a:rPr lang="en-US" altLang="ko-KR" dirty="0"/>
+              <a:t>)</a:t>
             </a:r>
             <a:br>
-              <a:rPr lang="en-US" altLang="ko-KR" dirty="0"/>
+              <a:rPr lang="ko-KR" altLang="en-US" dirty="0"/>
             </a:br>
             <a:r>
+              <a:rPr lang="ko-KR" altLang="en-US" dirty="0"/>
+              <a:t>→ 학생 숙제 발급</a:t>
+            </a:r>
+            <a:r>
+              <a:rPr lang="en-US" altLang="ko-KR" dirty="0"/>
+              <a:t>/</a:t>
+            </a:r>
+            <a:r>
+              <a:rPr lang="ko-KR" altLang="en-US" dirty="0"/>
+              <a:t>관리</a:t>
+            </a:r>
+            <a:r>
               <a:rPr lang="en-US" altLang="ko-KR" dirty="0"/>
               <a:t>(</a:t>
             </a:r>
             <a:r>
               <a:rPr lang="ko-KR" altLang="en-US" dirty="0"/>
-              <a:t>중복 가능</a:t>
+              <a:t>학생 탭 전용</a:t>
+            </a:r>
+            <a:r>
+              <a:rPr lang="en-US" altLang="ko-KR" dirty="0"/>
+              <a:t>) — </a:t>
+            </a:r>
+            <a:r>
+              <a:rPr lang="ko-KR" altLang="en-US" dirty="0"/>
+              <a:t>숙제는 학생 탭</a:t>
+            </a:r>
+            <a:r>
+              <a:rPr lang="en-US" altLang="ko-KR" dirty="0"/>
+              <a:t>(</a:t>
+            </a:r>
+            <a:r>
+              <a:rPr lang="ko-KR" altLang="en-US" dirty="0"/>
+              <a:t>학생 상세</a:t>
             </a:r>
             <a:r>
               <a:rPr lang="en-US" altLang="ko-KR" dirty="0"/>
               <a:t>)</a:t>
+            </a:r>
+            <a:r>
+              <a:rPr lang="ko-KR" altLang="en-US" dirty="0"/>
+              <a:t>에서만 발급</a:t>
+            </a:r>
+            <a:r>
+              <a:rPr lang="en-US" altLang="ko-KR" dirty="0"/>
+              <a:t>/</a:t>
+            </a:r>
+            <a:r>
+              <a:rPr lang="ko-KR" altLang="en-US" dirty="0"/>
+              <a:t>수정</a:t>
+            </a:r>
+            <a:r>
+              <a:rPr lang="en-US" altLang="ko-KR" dirty="0"/>
+              <a:t>/</a:t>
+            </a:r>
+            <a:r>
+              <a:rPr lang="ko-KR" altLang="en-US" dirty="0"/>
+              <a:t>평가</a:t>
+            </a:r>
+            <a:r>
+              <a:rPr lang="en-US" altLang="ko-KR" dirty="0"/>
+              <a:t>. </a:t>
+            </a:r>
+            <a:r>
+              <a:rPr lang="ko-KR" altLang="en-US" dirty="0"/>
+              <a:t>발급 시 과목</a:t>
+            </a:r>
+            <a:r>
+              <a:rPr lang="en-US" altLang="ko-KR" dirty="0"/>
+              <a:t>/</a:t>
+            </a:r>
+            <a:r>
+              <a:rPr lang="ko-KR" altLang="en-US" dirty="0"/>
+              <a:t>교재</a:t>
+            </a:r>
+            <a:r>
+              <a:rPr lang="en-US" altLang="ko-KR" dirty="0"/>
+              <a:t>·</a:t>
+            </a:r>
+            <a:r>
+              <a:rPr lang="ko-KR" altLang="en-US" dirty="0"/>
+              <a:t>단원</a:t>
+            </a:r>
+            <a:r>
+              <a:rPr lang="en-US" altLang="ko-KR" dirty="0"/>
+              <a:t>, </a:t>
+            </a:r>
+            <a:r>
+              <a:rPr lang="ko-KR" altLang="en-US" dirty="0"/>
+              <a:t>발급일</a:t>
+            </a:r>
+            <a:r>
+              <a:rPr lang="en-US" altLang="ko-KR" dirty="0"/>
+              <a:t>(</a:t>
+            </a:r>
+            <a:r>
+              <a:rPr lang="en-US" altLang="ko-KR" dirty="0" err="1"/>
+              <a:t>assignedAt</a:t>
+            </a:r>
+            <a:r>
+              <a:rPr lang="en-US" altLang="ko-KR" dirty="0"/>
+              <a:t>), </a:t>
+            </a:r>
+            <a:r>
+              <a:rPr lang="ko-KR" altLang="en-US" dirty="0"/>
+              <a:t>담당 선생</a:t>
+            </a:r>
+            <a:r>
+              <a:rPr lang="en-US" altLang="ko-KR" dirty="0"/>
+              <a:t>(</a:t>
+            </a:r>
+            <a:r>
+              <a:rPr lang="en-US" altLang="ko-KR" dirty="0" err="1"/>
+              <a:t>teacherUsername</a:t>
+            </a:r>
+            <a:r>
+              <a:rPr lang="en-US" altLang="ko-KR" dirty="0"/>
+              <a:t>), </a:t>
+            </a:r>
+            <a:r>
+              <a:rPr lang="ko-KR" altLang="en-US" dirty="0"/>
+              <a:t>마감일</a:t>
+            </a:r>
+            <a:r>
+              <a:rPr lang="en-US" altLang="ko-KR" dirty="0"/>
+              <a:t>(</a:t>
+            </a:r>
+            <a:r>
+              <a:rPr lang="en-US" altLang="ko-KR" dirty="0" err="1"/>
+              <a:t>dueDate</a:t>
+            </a:r>
+            <a:r>
+              <a:rPr lang="en-US" altLang="ko-KR" dirty="0"/>
+              <a:t>) </a:t>
+            </a:r>
+            <a:r>
+              <a:rPr lang="ko-KR" altLang="en-US" dirty="0"/>
+              <a:t>저장</a:t>
             </a:r>
             <a:br>
               <a:rPr lang="en-US" altLang="ko-KR" dirty="0"/>
@@ -4279,30 +4404,50 @@
             </a:pPr>
             <a:r>
               <a:rPr lang="ko-KR" altLang="en-US" dirty="0"/>
-              <a:t>학생 숙제 확인</a:t>
+              <a:t>학생 숙제 확인 평가</a:t>
+            </a:r>
+            <a:r>
+              <a:rPr lang="en-US" altLang="ko-KR" dirty="0"/>
+              <a:t>(0~100</a:t>
+            </a:r>
+            <a:r>
+              <a:rPr lang="ko-KR" altLang="en-US" dirty="0"/>
+              <a:t>점 스크롤 가능</a:t>
+            </a:r>
+            <a:r>
+              <a:rPr lang="en-US" altLang="ko-KR" dirty="0"/>
+              <a:t>) </a:t>
+            </a:r>
+            <a:r>
+              <a:rPr lang="ko-KR" altLang="en-US" dirty="0"/>
+              <a:t>기능</a:t>
             </a:r>
             <a:br>
-              <a:rPr lang="en-US" altLang="ko-KR" dirty="0"/>
+              <a:rPr lang="ko-KR" altLang="en-US" dirty="0"/>
             </a:br>
             <a:r>
               <a:rPr lang="ko-KR" altLang="en-US" dirty="0"/>
-              <a:t>평가</a:t>
-            </a:r>
-            <a:r>
-              <a:rPr lang="en-US" altLang="ko-KR" dirty="0"/>
-              <a:t>(0~100</a:t>
-            </a:r>
-            <a:r>
-              <a:rPr lang="ko-KR" altLang="en-US" dirty="0"/>
-              <a:t>점 스크롤 가능</a:t>
-            </a:r>
-            <a:r>
-              <a:rPr lang="en-US" altLang="ko-KR" dirty="0"/>
-              <a:t>)</a:t>
-            </a:r>
-            <a:r>
-              <a:rPr lang="ko-KR" altLang="en-US" dirty="0"/>
-              <a:t> 기능</a:t>
+              <a:t>→ 학생 숙제 확인 </a:t>
+            </a:r>
+            <a:r>
+              <a:rPr lang="en-US" altLang="ko-KR" dirty="0"/>
+              <a:t>— </a:t>
+            </a:r>
+            <a:r>
+              <a:rPr lang="ko-KR" altLang="en-US" dirty="0"/>
+              <a:t>현재</a:t>
+            </a:r>
+            <a:r>
+              <a:rPr lang="en-US" altLang="ko-KR" dirty="0"/>
+              <a:t>/</a:t>
+            </a:r>
+            <a:r>
+              <a:rPr lang="ko-KR" altLang="en-US" dirty="0"/>
+              <a:t>완료 숙제 조회 및 숙제별 평가</a:t>
+            </a:r>
+            <a:r>
+              <a:rPr lang="en-US" altLang="ko-KR" dirty="0"/>
+              <a:t>(0~100)</a:t>
             </a:r>
             <a:br>
               <a:rPr lang="en-US" altLang="ko-KR" dirty="0"/>
@@ -4700,9 +4845,44 @@
             </a:pPr>
             <a:r>
               <a:rPr lang="ko-KR" altLang="en-US" sz="1400" dirty="0"/>
-              <a:t>수업 평가 및 숙제 발급용 탭</a:t>
-            </a:r>
-            <a:endParaRPr lang="en-US" altLang="ko-KR" sz="1400" dirty="0"/>
+              <a:t>수업 진행</a:t>
+            </a:r>
+            <a:r>
+              <a:rPr lang="en-US" altLang="ko-KR" sz="1400" dirty="0"/>
+              <a:t>/</a:t>
+            </a:r>
+            <a:r>
+              <a:rPr lang="ko-KR" altLang="en-US" sz="1400" dirty="0"/>
+              <a:t>조회 탭</a:t>
+            </a:r>
+            <a:r>
+              <a:rPr lang="en-US" altLang="ko-KR" sz="1400" dirty="0"/>
+              <a:t>(</a:t>
+            </a:r>
+            <a:r>
+              <a:rPr lang="ko-KR" altLang="en-US" sz="1400" dirty="0"/>
+              <a:t>평가</a:t>
+            </a:r>
+            <a:r>
+              <a:rPr lang="en-US" altLang="ko-KR" sz="1400" dirty="0"/>
+              <a:t>·</a:t>
+            </a:r>
+            <a:r>
+              <a:rPr lang="ko-KR" altLang="en-US" sz="1400" dirty="0"/>
+              <a:t>출석</a:t>
+            </a:r>
+            <a:r>
+              <a:rPr lang="en-US" altLang="ko-KR" sz="1400" dirty="0"/>
+              <a:t>·</a:t>
+            </a:r>
+            <a:r>
+              <a:rPr lang="ko-KR" altLang="en-US" sz="1400" dirty="0"/>
+              <a:t>메모 등 진행 작업 전용</a:t>
+            </a:r>
+            <a:r>
+              <a:rPr lang="en-US" altLang="ko-KR" sz="1400" dirty="0"/>
+              <a:t>)</a:t>
+            </a:r>
           </a:p>
           <a:p>
             <a:pPr marL="742950" lvl="1" indent="-285750">
@@ -4725,6 +4905,20 @@
             </a:pPr>
             <a:r>
               <a:rPr lang="ko-KR" altLang="en-US" sz="1400" dirty="0"/>
+              <a:t>수업 탭에서 학생을 선택하면 학생 탭의 해당 학생 상세 화면으로 이동한다</a:t>
+            </a:r>
+            <a:r>
+              <a:rPr lang="en-US" altLang="ko-KR" sz="1400" dirty="0"/>
+              <a:t>.</a:t>
+            </a:r>
+          </a:p>
+          <a:p>
+            <a:pPr marL="742950" lvl="1" indent="-285750">
+              <a:buFont typeface="Arial" panose="020B0604020202020204" pitchFamily="34" charset="0"/>
+              <a:buChar char="•"/>
+            </a:pPr>
+            <a:r>
+              <a:rPr lang="ko-KR" altLang="en-US" sz="1400" dirty="0"/>
               <a:t>수업 추가</a:t>
             </a:r>
             <a:r>
@@ -4747,11 +4941,7 @@
             </a:pPr>
             <a:r>
               <a:rPr lang="ko-KR" altLang="en-US" sz="1400" dirty="0"/>
-              <a:t>수업 탭의 달력은 “이미 생성된 수업을 시간 기준으로 모아서 보는 </a:t>
-            </a:r>
-            <a:r>
-              <a:rPr lang="ko-KR" altLang="en-US" sz="1400" dirty="0" err="1"/>
-              <a:t>화면”이다</a:t>
+              <a:t>수업 탭의 달력은 이미 생성된 수업을 시간 기준으로 모아 보는 조회 화면이다</a:t>
             </a:r>
             <a:r>
               <a:rPr lang="en-US" altLang="ko-KR" sz="1400" dirty="0"/>
@@ -4785,14 +4975,8 @@
             </a:r>
             <a:r>
               <a:rPr lang="en-US" altLang="ko-KR" sz="1400" dirty="0"/>
-              <a:t>.</a:t>
-            </a:r>
-          </a:p>
-          <a:p>
-            <a:pPr marL="742950" lvl="1" indent="-285750">
-              <a:buFont typeface="Arial" panose="020B0604020202020204" pitchFamily="34" charset="0"/>
-              <a:buChar char="•"/>
-            </a:pPr>
+              <a:t>. </a:t>
+            </a:r>
             <a:r>
               <a:rPr lang="ko-KR" altLang="en-US" sz="1400" dirty="0"/>
               <a:t>수업 탭은 이미 생성된 수업을 시간표 형태로 보여주고</a:t>
@@ -4815,36 +4999,8 @@
             </a:r>
             <a:r>
               <a:rPr lang="en-US" altLang="ko-KR" sz="1400" dirty="0"/>
-              <a:t>.</a:t>
-            </a:r>
-          </a:p>
-          <a:p>
-            <a:pPr marL="742950" lvl="1" indent="-285750">
-              <a:buFont typeface="Arial" panose="020B0604020202020204" pitchFamily="34" charset="0"/>
-              <a:buChar char="•"/>
-            </a:pPr>
-            <a:r>
-              <a:rPr lang="ko-KR" altLang="en-US" sz="1400" dirty="0"/>
-              <a:t>수업 탭에서 학생을 선택하면</a:t>
-            </a:r>
-            <a:r>
-              <a:rPr lang="en-US" altLang="ko-KR" sz="1400" dirty="0"/>
-              <a:t>, </a:t>
-            </a:r>
-            <a:r>
-              <a:rPr lang="ko-KR" altLang="en-US" sz="1400" dirty="0"/>
-              <a:t>학생 탭의 해당 학생 상세 화면으로 이동한다</a:t>
-            </a:r>
-            <a:r>
-              <a:rPr lang="en-US" altLang="ko-KR" sz="1400" dirty="0"/>
-              <a:t>.</a:t>
-            </a:r>
-          </a:p>
-          <a:p>
-            <a:pPr marL="742950" lvl="1" indent="-285750">
-              <a:buFont typeface="Arial" panose="020B0604020202020204" pitchFamily="34" charset="0"/>
-              <a:buChar char="•"/>
-            </a:pPr>
+              <a:t>. </a:t>
+            </a:r>
             <a:r>
               <a:rPr lang="ko-KR" altLang="en-US" sz="1400" dirty="0"/>
               <a:t>오늘 한 수업</a:t>
@@ -5085,7 +5241,7 @@
         <p:spPr>
           <a:xfrm>
             <a:off x="206733" y="640485"/>
-            <a:ext cx="8173941" cy="3970318"/>
+            <a:ext cx="8173941" cy="4154984"/>
           </a:xfrm>
           <a:prstGeom prst="rect">
             <a:avLst/>
@@ -5162,93 +5318,224 @@
             </a:pPr>
             <a:r>
               <a:rPr lang="ko-KR" altLang="en-US" sz="1200" dirty="0"/>
-              <a:t>필터링 방식으로 확인할 학생을 검색</a:t>
+              <a:t>필터</a:t>
+            </a:r>
+            <a:r>
+              <a:rPr lang="en-US" altLang="ko-KR" sz="1200" dirty="0"/>
+              <a:t>(</a:t>
+            </a:r>
+            <a:r>
+              <a:rPr lang="ko-KR" altLang="en-US" sz="1200" dirty="0"/>
+              <a:t>오늘 수업 있음</a:t>
+            </a:r>
+            <a:r>
+              <a:rPr lang="en-US" altLang="ko-KR" sz="1200" dirty="0"/>
+              <a:t>, </a:t>
+            </a:r>
+            <a:r>
+              <a:rPr lang="ko-KR" altLang="en-US" sz="1200" dirty="0"/>
+              <a:t>숙제 있음</a:t>
+            </a:r>
+            <a:r>
+              <a:rPr lang="en-US" altLang="ko-KR" sz="1200" dirty="0"/>
+              <a:t>, </a:t>
+            </a:r>
+            <a:r>
+              <a:rPr lang="ko-KR" altLang="en-US" sz="1200" dirty="0"/>
+              <a:t>이름</a:t>
+            </a:r>
+            <a:r>
+              <a:rPr lang="en-US" altLang="ko-KR" sz="1200" dirty="0"/>
+              <a:t>/</a:t>
+            </a:r>
+            <a:r>
+              <a:rPr lang="ko-KR" altLang="en-US" sz="1200" dirty="0"/>
+              <a:t>초성 등</a:t>
+            </a:r>
+            <a:r>
+              <a:rPr lang="en-US" altLang="ko-KR" sz="1200" dirty="0"/>
+              <a:t>) </a:t>
+            </a:r>
+            <a:r>
+              <a:rPr lang="ko-KR" altLang="en-US" sz="1200" dirty="0"/>
+              <a:t>제공</a:t>
+            </a:r>
+            <a:r>
+              <a:rPr lang="en-US" altLang="ko-KR" sz="1200" dirty="0"/>
+              <a:t>. </a:t>
             </a:r>
             <a:br>
               <a:rPr lang="en-US" altLang="ko-KR" sz="1200" dirty="0"/>
             </a:br>
             <a:r>
+              <a:rPr lang="ko-KR" altLang="en-US" sz="1200" dirty="0"/>
+              <a:t>필터는 학생 탭에서만 유지</a:t>
+            </a:r>
+            <a:r>
               <a:rPr lang="en-US" altLang="ko-KR" sz="1200" dirty="0"/>
               <a:t>(</a:t>
             </a:r>
             <a:r>
               <a:rPr lang="ko-KR" altLang="en-US" sz="1200" dirty="0"/>
-              <a:t>필터링 </a:t>
+              <a:t>다른 탭 갔다 돌아와도 유지</a:t>
             </a:r>
             <a:r>
               <a:rPr lang="en-US" altLang="ko-KR" sz="1200" dirty="0"/>
-              <a:t>: </a:t>
-            </a:r>
+              <a:t>).</a:t>
+            </a:r>
+          </a:p>
+          <a:p>
+            <a:pPr marL="742950" lvl="1" indent="-285750">
+              <a:buFont typeface="Arial" panose="020B0604020202020204" pitchFamily="34" charset="0"/>
+              <a:buChar char="•"/>
+            </a:pPr>
             <a:r>
               <a:rPr lang="ko-KR" altLang="en-US" sz="1200" dirty="0"/>
-              <a:t>오늘 수업 있는지 체크박스</a:t>
+              <a:t>학생 선택 후</a:t>
+            </a:r>
+            <a:endParaRPr lang="en-US" altLang="ko-KR" sz="1200" dirty="0"/>
+          </a:p>
+          <a:p>
+            <a:pPr marL="1200150" lvl="2" indent="-285750">
+              <a:buFont typeface="Arial" panose="020B0604020202020204" pitchFamily="34" charset="0"/>
+              <a:buChar char="•"/>
+            </a:pPr>
+            <a:r>
+              <a:rPr lang="ko-KR" altLang="en-US" sz="1200" dirty="0"/>
+              <a:t>수업 관리</a:t>
+            </a:r>
+            <a:endParaRPr lang="en-US" altLang="ko-KR" sz="1200" dirty="0"/>
+          </a:p>
+          <a:p>
+            <a:pPr marL="1657350" lvl="3" indent="-285750">
+              <a:buFont typeface="Arial" panose="020B0604020202020204" pitchFamily="34" charset="0"/>
+              <a:buChar char="•"/>
+            </a:pPr>
+            <a:r>
+              <a:rPr lang="ko-KR" altLang="en-US" sz="1200" dirty="0"/>
+              <a:t>학생 상세의 달력</a:t>
             </a:r>
             <a:r>
               <a:rPr lang="en-US" altLang="ko-KR" sz="1200" dirty="0"/>
-              <a:t>, </a:t>
+              <a:t>/</a:t>
             </a:r>
             <a:r>
               <a:rPr lang="ko-KR" altLang="en-US" sz="1200" dirty="0"/>
-              <a:t>숙제 있는 학생 체크박스</a:t>
+              <a:t>리스트에서 수업 추가</a:t>
             </a:r>
             <a:r>
               <a:rPr lang="en-US" altLang="ko-KR" sz="1200" dirty="0"/>
-              <a:t>,</a:t>
+              <a:t>·</a:t>
+            </a:r>
+            <a:r>
+              <a:rPr lang="ko-KR" altLang="en-US" sz="1200" dirty="0"/>
+              <a:t>변경</a:t>
+            </a:r>
+            <a:r>
+              <a:rPr lang="en-US" altLang="ko-KR" sz="1200" dirty="0"/>
+              <a:t>·</a:t>
+            </a:r>
+            <a:r>
+              <a:rPr lang="ko-KR" altLang="en-US" sz="1200" dirty="0"/>
+              <a:t>삭제</a:t>
+            </a:r>
+            <a:r>
+              <a:rPr lang="en-US" altLang="ko-KR" sz="1200" dirty="0"/>
+              <a:t>·</a:t>
+            </a:r>
+            <a:r>
+              <a:rPr lang="ko-KR" altLang="en-US" sz="1200" dirty="0"/>
+              <a:t>반복</a:t>
             </a:r>
             <a:br>
               <a:rPr lang="en-US" altLang="ko-KR" sz="1200" dirty="0"/>
             </a:br>
             <a:r>
-              <a:rPr lang="ko-KR" altLang="en-US" sz="1200" dirty="0"/>
-              <a:t>이름 필터링</a:t>
-            </a:r>
-            <a:r>
               <a:rPr lang="en-US" altLang="ko-KR" sz="1200" dirty="0"/>
               <a:t>(</a:t>
             </a:r>
             <a:r>
               <a:rPr lang="ko-KR" altLang="en-US" sz="1200" dirty="0"/>
-              <a:t>초성도 가능</a:t>
+              <a:t>반복 편집</a:t>
             </a:r>
             <a:r>
               <a:rPr lang="en-US" altLang="ko-KR" sz="1200" dirty="0"/>
-              <a:t>), </a:t>
+              <a:t>/</a:t>
             </a:r>
             <a:r>
               <a:rPr lang="ko-KR" altLang="en-US" sz="1200" dirty="0"/>
-              <a:t>해당 필터링 정도는 다른 탭이어도</a:t>
-            </a:r>
-            <a:br>
+              <a:t>삭제 시 “이 일정만 </a:t>
+            </a:r>
+            <a:r>
               <a:rPr lang="en-US" altLang="ko-KR" sz="1200" dirty="0"/>
-            </a:br>
+              <a:t>/ </a:t>
+            </a:r>
             <a:r>
               <a:rPr lang="ko-KR" altLang="en-US" sz="1200" dirty="0"/>
-              <a:t>초기화 되지 않음</a:t>
+              <a:t>시리즈 전체”</a:t>
             </a:r>
             <a:r>
               <a:rPr lang="en-US" altLang="ko-KR" sz="1200" dirty="0"/>
-              <a:t>)</a:t>
-            </a:r>
-          </a:p>
-          <a:p>
-            <a:pPr marL="742950" lvl="1" indent="-285750">
+              <a:t>).</a:t>
+            </a:r>
+          </a:p>
+          <a:p>
+            <a:pPr marL="1200150" lvl="2" indent="-285750">
               <a:buFont typeface="Arial" panose="020B0604020202020204" pitchFamily="34" charset="0"/>
               <a:buChar char="•"/>
             </a:pPr>
             <a:r>
               <a:rPr lang="ko-KR" altLang="en-US" sz="1200" dirty="0"/>
-              <a:t>학생 선택 후</a:t>
+              <a:t>각 과목 별</a:t>
             </a:r>
             <a:endParaRPr lang="en-US" altLang="ko-KR" sz="1200" dirty="0"/>
           </a:p>
           <a:p>
+            <a:pPr marL="1657350" lvl="3" indent="-285750">
+              <a:buFont typeface="Arial" panose="020B0604020202020204" pitchFamily="34" charset="0"/>
+              <a:buChar char="•"/>
+            </a:pPr>
+            <a:r>
+              <a:rPr lang="ko-KR" altLang="en-US" sz="1200" dirty="0"/>
+              <a:t>책</a:t>
+            </a:r>
+            <a:r>
+              <a:rPr lang="en-US" altLang="ko-KR" sz="1200" dirty="0"/>
+              <a:t>(</a:t>
+            </a:r>
+            <a:r>
+              <a:rPr lang="ko-KR" altLang="en-US" sz="1200" dirty="0"/>
+              <a:t>작게 책 이미지도 표시</a:t>
+            </a:r>
+            <a:r>
+              <a:rPr lang="en-US" altLang="ko-KR" sz="1200" dirty="0"/>
+              <a:t>) </a:t>
+            </a:r>
+            <a:r>
+              <a:rPr lang="ko-KR" altLang="en-US" sz="1200" dirty="0"/>
+              <a:t>표시</a:t>
+            </a:r>
+            <a:endParaRPr lang="en-US" altLang="ko-KR" sz="1200" dirty="0"/>
+          </a:p>
+          <a:p>
+            <a:pPr marL="2114550" lvl="4" indent="-285750">
+              <a:buFont typeface="Arial" panose="020B0604020202020204" pitchFamily="34" charset="0"/>
+              <a:buChar char="•"/>
+            </a:pPr>
+            <a:r>
+              <a:rPr lang="ko-KR" altLang="en-US" sz="1200" dirty="0"/>
+              <a:t>책 별 진도</a:t>
+            </a:r>
+            <a:endParaRPr lang="en-US" altLang="ko-KR" sz="1200" dirty="0"/>
+          </a:p>
+          <a:p>
             <a:pPr marL="1200150" lvl="2" indent="-285750">
               <a:buFont typeface="Arial" panose="020B0604020202020204" pitchFamily="34" charset="0"/>
               <a:buChar char="•"/>
             </a:pPr>
             <a:r>
               <a:rPr lang="ko-KR" altLang="en-US" sz="1200" dirty="0"/>
-              <a:t>수업 관리</a:t>
+              <a:t>수업 태도 평가</a:t>
             </a:r>
             <a:endParaRPr lang="en-US" altLang="ko-KR" sz="1200" dirty="0"/>
           </a:p>
@@ -5259,7 +5546,29 @@
             </a:pPr>
             <a:r>
               <a:rPr lang="ko-KR" altLang="en-US" sz="1200" dirty="0"/>
-              <a:t>학생 별 수업 추가</a:t>
+              <a:t>날짜별 정리</a:t>
+            </a:r>
+            <a:endParaRPr lang="en-US" altLang="ko-KR" sz="1200" dirty="0"/>
+          </a:p>
+          <a:p>
+            <a:pPr marL="1200150" lvl="2" indent="-285750">
+              <a:buFont typeface="Arial" panose="020B0604020202020204" pitchFamily="34" charset="0"/>
+              <a:buChar char="•"/>
+            </a:pPr>
+            <a:r>
+              <a:rPr lang="ko-KR" altLang="en-US" sz="1200" dirty="0"/>
+              <a:t>숙제</a:t>
+            </a:r>
+            <a:endParaRPr lang="en-US" altLang="ko-KR" sz="1200" dirty="0"/>
+          </a:p>
+          <a:p>
+            <a:pPr marL="1657350" lvl="3" indent="-285750">
+              <a:buFont typeface="Arial" panose="020B0604020202020204" pitchFamily="34" charset="0"/>
+              <a:buChar char="•"/>
+            </a:pPr>
+            <a:r>
+              <a:rPr lang="ko-KR" altLang="en-US" sz="1200" dirty="0"/>
+              <a:t>숙제 발급</a:t>
             </a:r>
             <a:r>
               <a:rPr lang="en-US" altLang="ko-KR" sz="1200" dirty="0"/>
@@ -5267,78 +5576,7 @@
             </a:r>
             <a:r>
               <a:rPr lang="ko-KR" altLang="en-US" sz="1200" dirty="0"/>
-              <a:t>혹은</a:t>
-            </a:r>
-            <a:endParaRPr lang="en-US" altLang="ko-KR" sz="1200" dirty="0"/>
-          </a:p>
-          <a:p>
-            <a:pPr marL="1200150" lvl="2" indent="-285750">
-              <a:buFont typeface="Arial" panose="020B0604020202020204" pitchFamily="34" charset="0"/>
-              <a:buChar char="•"/>
-            </a:pPr>
-            <a:r>
-              <a:rPr lang="ko-KR" altLang="en-US" sz="1200" dirty="0"/>
-              <a:t>각 과목 별</a:t>
-            </a:r>
-            <a:endParaRPr lang="en-US" altLang="ko-KR" sz="1200" dirty="0"/>
-          </a:p>
-          <a:p>
-            <a:pPr marL="1657350" lvl="3" indent="-285750">
-              <a:buFont typeface="Arial" panose="020B0604020202020204" pitchFamily="34" charset="0"/>
-              <a:buChar char="•"/>
-            </a:pPr>
-            <a:r>
-              <a:rPr lang="ko-KR" altLang="en-US" sz="1200" dirty="0"/>
-              <a:t>책</a:t>
-            </a:r>
-            <a:r>
-              <a:rPr lang="en-US" altLang="ko-KR" sz="1200" dirty="0"/>
-              <a:t>(</a:t>
-            </a:r>
-            <a:r>
-              <a:rPr lang="ko-KR" altLang="en-US" sz="1200" dirty="0"/>
-              <a:t>작게 책 이미지도 표시</a:t>
-            </a:r>
-            <a:r>
-              <a:rPr lang="en-US" altLang="ko-KR" sz="1200" dirty="0"/>
-              <a:t>) </a:t>
-            </a:r>
-            <a:r>
-              <a:rPr lang="ko-KR" altLang="en-US" sz="1200" dirty="0"/>
-              <a:t>표시</a:t>
-            </a:r>
-            <a:endParaRPr lang="en-US" altLang="ko-KR" sz="1200" dirty="0"/>
-          </a:p>
-          <a:p>
-            <a:pPr marL="2114550" lvl="4" indent="-285750">
-              <a:buFont typeface="Arial" panose="020B0604020202020204" pitchFamily="34" charset="0"/>
-              <a:buChar char="•"/>
-            </a:pPr>
-            <a:r>
-              <a:rPr lang="ko-KR" altLang="en-US" sz="1200" dirty="0"/>
-              <a:t>책 별 </a:t>
-            </a:r>
-            <a:endParaRPr lang="en-US" altLang="ko-KR" sz="1200" dirty="0"/>
-          </a:p>
-          <a:p>
-            <a:pPr marL="1200150" lvl="2" indent="-285750">
-              <a:buFont typeface="Arial" panose="020B0604020202020204" pitchFamily="34" charset="0"/>
-              <a:buChar char="•"/>
-            </a:pPr>
-            <a:r>
-              <a:rPr lang="ko-KR" altLang="en-US" sz="1200" dirty="0"/>
-              <a:t>수업 태도 평가</a:t>
-            </a:r>
-            <a:endParaRPr lang="en-US" altLang="ko-KR" sz="1200" dirty="0"/>
-          </a:p>
-          <a:p>
-            <a:pPr marL="1200150" lvl="2" indent="-285750">
-              <a:buFont typeface="Arial" panose="020B0604020202020204" pitchFamily="34" charset="0"/>
-              <a:buChar char="•"/>
-            </a:pPr>
-            <a:r>
-              <a:rPr lang="ko-KR" altLang="en-US" sz="1200" dirty="0"/>
-              <a:t>숙제</a:t>
+              <a:t>체크</a:t>
             </a:r>
             <a:endParaRPr lang="en-US" altLang="ko-KR" sz="1200" dirty="0"/>
           </a:p>

</xml_diff>